<commit_message>
Make changes to PPP
</commit_message>
<xml_diff>
--- a/docs/diagrams/AddapptActivityDiagram.pptx
+++ b/docs/diagrams/AddapptActivityDiagram.pptx
@@ -3356,8 +3356,8 @@
         </p:nvSpPr>
         <p:spPr>
           <a:xfrm>
-            <a:off x="2390862" y="528506"/>
-            <a:ext cx="7080309" cy="4748169"/>
+            <a:off x="604008" y="528506"/>
+            <a:ext cx="11132190" cy="4748169"/>
           </a:xfrm>
           <a:prstGeom prst="roundRect">
             <a:avLst>

</xml_diff>